<commit_message>
Discover now BT-Modules an list them.
</commit_message>
<xml_diff>
--- a/Praesentation.pptx
+++ b/Praesentation.pptx
@@ -7,6 +7,9 @@
   <p:sldIdLst>
     <p:sldId id="256" r:id="rId2"/>
     <p:sldId id="257" r:id="rId3"/>
+    <p:sldId id="258" r:id="rId4"/>
+    <p:sldId id="259" r:id="rId5"/>
+    <p:sldId id="260" r:id="rId6"/>
   </p:sldIdLst>
   <p:sldSz cx="9144000" cy="6858000" type="screen4x3"/>
   <p:notesSz cx="6858000" cy="9144000"/>
@@ -5162,6 +5165,242 @@
 </p:sld>
 </file>
 
+<file path=ppt/slides/slide3.xml><?xml version="1.0" encoding="utf-8"?>
+<p:sld xmlns:a="http://schemas.openxmlformats.org/drawingml/2006/main" xmlns:r="http://schemas.openxmlformats.org/officeDocument/2006/relationships" xmlns:p="http://schemas.openxmlformats.org/presentationml/2006/main">
+  <p:cSld>
+    <p:spTree>
+      <p:nvGrpSpPr>
+        <p:cNvPr id="1" name=""/>
+        <p:cNvGrpSpPr/>
+        <p:nvPr/>
+      </p:nvGrpSpPr>
+      <p:grpSpPr>
+        <a:xfrm>
+          <a:off x="0" y="0"/>
+          <a:ext cx="0" cy="0"/>
+          <a:chOff x="0" y="0"/>
+          <a:chExt cx="0" cy="0"/>
+        </a:xfrm>
+      </p:grpSpPr>
+      <p:sp>
+        <p:nvSpPr>
+          <p:cNvPr id="2" name="Inhaltsplatzhalter 1"/>
+          <p:cNvSpPr>
+            <a:spLocks noGrp="1"/>
+          </p:cNvSpPr>
+          <p:nvPr>
+            <p:ph idx="1"/>
+          </p:nvPr>
+        </p:nvSpPr>
+        <p:spPr/>
+        <p:txBody>
+          <a:bodyPr/>
+          <a:lstStyle/>
+          <a:p>
+            <a:r>
+              <a:rPr lang="de-CH" dirty="0" smtClean="0"/>
+              <a:t>Unterstützung </a:t>
+            </a:r>
+            <a:r>
+              <a:rPr lang="de-CH" dirty="0"/>
+              <a:t>Smartphone &amp; Tabletts (inkl. Fragments) </a:t>
+            </a:r>
+            <a:endParaRPr lang="de-CH" dirty="0" smtClean="0"/>
+          </a:p>
+          <a:p>
+            <a:r>
+              <a:rPr lang="de-CH" dirty="0"/>
+              <a:t>Verwendung von Nebenläufigkeit </a:t>
+            </a:r>
+            <a:endParaRPr lang="de-CH" dirty="0" smtClean="0"/>
+          </a:p>
+          <a:p>
+            <a:endParaRPr lang="de-CH" dirty="0"/>
+          </a:p>
+        </p:txBody>
+      </p:sp>
+      <p:sp>
+        <p:nvSpPr>
+          <p:cNvPr id="3" name="Titel 2"/>
+          <p:cNvSpPr>
+            <a:spLocks noGrp="1"/>
+          </p:cNvSpPr>
+          <p:nvPr>
+            <p:ph type="title"/>
+          </p:nvPr>
+        </p:nvSpPr>
+        <p:spPr/>
+        <p:txBody>
+          <a:bodyPr/>
+          <a:lstStyle/>
+          <a:p>
+            <a:r>
+              <a:rPr lang="de-CH" dirty="0"/>
+              <a:t>Technische Anforderungen </a:t>
+            </a:r>
+          </a:p>
+        </p:txBody>
+      </p:sp>
+    </p:spTree>
+    <p:extLst>
+      <p:ext uri="{BB962C8B-B14F-4D97-AF65-F5344CB8AC3E}">
+        <p14:creationId xmlns:p14="http://schemas.microsoft.com/office/powerpoint/2010/main" val="998841731"/>
+      </p:ext>
+    </p:extLst>
+  </p:cSld>
+  <p:clrMapOvr>
+    <a:masterClrMapping/>
+  </p:clrMapOvr>
+</p:sld>
+</file>
+
+<file path=ppt/slides/slide4.xml><?xml version="1.0" encoding="utf-8"?>
+<p:sld xmlns:a="http://schemas.openxmlformats.org/drawingml/2006/main" xmlns:r="http://schemas.openxmlformats.org/officeDocument/2006/relationships" xmlns:p="http://schemas.openxmlformats.org/presentationml/2006/main">
+  <p:cSld>
+    <p:spTree>
+      <p:nvGrpSpPr>
+        <p:cNvPr id="1" name=""/>
+        <p:cNvGrpSpPr/>
+        <p:nvPr/>
+      </p:nvGrpSpPr>
+      <p:grpSpPr>
+        <a:xfrm>
+          <a:off x="0" y="0"/>
+          <a:ext cx="0" cy="0"/>
+          <a:chOff x="0" y="0"/>
+          <a:chExt cx="0" cy="0"/>
+        </a:xfrm>
+      </p:grpSpPr>
+      <p:sp>
+        <p:nvSpPr>
+          <p:cNvPr id="3" name="Titel 2"/>
+          <p:cNvSpPr>
+            <a:spLocks noGrp="1"/>
+          </p:cNvSpPr>
+          <p:nvPr>
+            <p:ph type="title"/>
+          </p:nvPr>
+        </p:nvSpPr>
+        <p:spPr/>
+        <p:txBody>
+          <a:bodyPr/>
+          <a:lstStyle/>
+          <a:p>
+            <a:r>
+              <a:rPr lang="de-CH" dirty="0" smtClean="0"/>
+              <a:t>Demo</a:t>
+            </a:r>
+            <a:endParaRPr lang="de-CH" dirty="0"/>
+          </a:p>
+        </p:txBody>
+      </p:sp>
+    </p:spTree>
+    <p:extLst>
+      <p:ext uri="{BB962C8B-B14F-4D97-AF65-F5344CB8AC3E}">
+        <p14:creationId xmlns:p14="http://schemas.microsoft.com/office/powerpoint/2010/main" val="3395262269"/>
+      </p:ext>
+    </p:extLst>
+  </p:cSld>
+  <p:clrMapOvr>
+    <a:masterClrMapping/>
+  </p:clrMapOvr>
+</p:sld>
+</file>
+
+<file path=ppt/slides/slide5.xml><?xml version="1.0" encoding="utf-8"?>
+<p:sld xmlns:a="http://schemas.openxmlformats.org/drawingml/2006/main" xmlns:r="http://schemas.openxmlformats.org/officeDocument/2006/relationships" xmlns:p="http://schemas.openxmlformats.org/presentationml/2006/main">
+  <p:cSld>
+    <p:spTree>
+      <p:nvGrpSpPr>
+        <p:cNvPr id="1" name=""/>
+        <p:cNvGrpSpPr/>
+        <p:nvPr/>
+      </p:nvGrpSpPr>
+      <p:grpSpPr>
+        <a:xfrm>
+          <a:off x="0" y="0"/>
+          <a:ext cx="0" cy="0"/>
+          <a:chOff x="0" y="0"/>
+          <a:chExt cx="0" cy="0"/>
+        </a:xfrm>
+      </p:grpSpPr>
+      <p:sp>
+        <p:nvSpPr>
+          <p:cNvPr id="3" name="Titel 2"/>
+          <p:cNvSpPr>
+            <a:spLocks noGrp="1"/>
+          </p:cNvSpPr>
+          <p:nvPr>
+            <p:ph type="title"/>
+          </p:nvPr>
+        </p:nvSpPr>
+        <p:spPr/>
+        <p:txBody>
+          <a:bodyPr/>
+          <a:lstStyle/>
+          <a:p>
+            <a:r>
+              <a:rPr lang="de-CH" dirty="0" smtClean="0"/>
+              <a:t>Fragen</a:t>
+            </a:r>
+            <a:endParaRPr lang="de-CH" dirty="0"/>
+          </a:p>
+        </p:txBody>
+      </p:sp>
+      <p:pic>
+        <p:nvPicPr>
+          <p:cNvPr id="4" name="Picture 4" descr="http://images.clipartpanda.com/blue-question-mark-clipart-yioxqLBiE.png"/>
+          <p:cNvPicPr>
+            <a:picLocks noChangeAspect="1" noChangeArrowheads="1"/>
+          </p:cNvPicPr>
+          <p:nvPr/>
+        </p:nvPicPr>
+        <p:blipFill>
+          <a:blip r:embed="rId2">
+            <a:extLst>
+              <a:ext uri="{28A0092B-C50C-407E-A947-70E740481C1C}">
+                <a14:useLocalDpi xmlns:a14="http://schemas.microsoft.com/office/drawing/2010/main" val="0"/>
+              </a:ext>
+            </a:extLst>
+          </a:blip>
+          <a:srcRect/>
+          <a:stretch>
+            <a:fillRect/>
+          </a:stretch>
+        </p:blipFill>
+        <p:spPr bwMode="auto">
+          <a:xfrm>
+            <a:off x="3419872" y="1916832"/>
+            <a:ext cx="2338977" cy="3526185"/>
+          </a:xfrm>
+          <a:prstGeom prst="rect">
+            <a:avLst/>
+          </a:prstGeom>
+          <a:noFill/>
+          <a:extLst>
+            <a:ext uri="{909E8E84-426E-40DD-AFC4-6F175D3DCCD1}">
+              <a14:hiddenFill xmlns:a14="http://schemas.microsoft.com/office/drawing/2010/main">
+                <a:solidFill>
+                  <a:srgbClr val="FFFFFF"/>
+                </a:solidFill>
+              </a14:hiddenFill>
+            </a:ext>
+          </a:extLst>
+        </p:spPr>
+      </p:pic>
+    </p:spTree>
+    <p:extLst>
+      <p:ext uri="{BB962C8B-B14F-4D97-AF65-F5344CB8AC3E}">
+        <p14:creationId xmlns:p14="http://schemas.microsoft.com/office/powerpoint/2010/main" val="4094138596"/>
+      </p:ext>
+    </p:extLst>
+  </p:cSld>
+  <p:clrMapOvr>
+    <a:masterClrMapping/>
+  </p:clrMapOvr>
+</p:sld>
+</file>
+
 <file path=ppt/theme/theme1.xml><?xml version="1.0" encoding="utf-8"?>
 <a:theme xmlns:a="http://schemas.openxmlformats.org/drawingml/2006/main" name="Deimos">
   <a:themeElements>

</xml_diff>

<commit_message>
It works!!!!!!!!!!!!!!!!!! GPIO SCHWEINEBACKE!
</commit_message>
<xml_diff>
--- a/Praesentation.pptx
+++ b/Praesentation.pptx
@@ -9,8 +9,9 @@
     <p:sldId id="257" r:id="rId3"/>
     <p:sldId id="258" r:id="rId4"/>
     <p:sldId id="261" r:id="rId5"/>
-    <p:sldId id="259" r:id="rId6"/>
-    <p:sldId id="260" r:id="rId7"/>
+    <p:sldId id="262" r:id="rId6"/>
+    <p:sldId id="259" r:id="rId7"/>
+    <p:sldId id="260" r:id="rId8"/>
   </p:sldIdLst>
   <p:sldSz cx="9144000" cy="6858000" type="screen4x3"/>
   <p:notesSz cx="6858000" cy="9144000"/>
@@ -737,7 +738,7 @@
           <a:p>
             <a:fld id="{8588FC70-2C7A-4951-B9AD-39FC0F67E4FE}" type="datetimeFigureOut">
               <a:rPr lang="de-CH" smtClean="0"/>
-              <a:t>04.05.2015</a:t>
+              <a:t>05.05.2015</a:t>
             </a:fld>
             <a:endParaRPr lang="de-CH"/>
           </a:p>
@@ -933,7 +934,7 @@
           <a:p>
             <a:fld id="{8588FC70-2C7A-4951-B9AD-39FC0F67E4FE}" type="datetimeFigureOut">
               <a:rPr lang="de-CH" smtClean="0"/>
-              <a:t>04.05.2015</a:t>
+              <a:t>05.05.2015</a:t>
             </a:fld>
             <a:endParaRPr lang="de-CH"/>
           </a:p>
@@ -1118,7 +1119,7 @@
           <a:p>
             <a:fld id="{8588FC70-2C7A-4951-B9AD-39FC0F67E4FE}" type="datetimeFigureOut">
               <a:rPr lang="de-CH" smtClean="0"/>
-              <a:t>04.05.2015</a:t>
+              <a:t>05.05.2015</a:t>
             </a:fld>
             <a:endParaRPr lang="de-CH"/>
           </a:p>
@@ -1268,7 +1269,7 @@
           <a:p>
             <a:fld id="{8588FC70-2C7A-4951-B9AD-39FC0F67E4FE}" type="datetimeFigureOut">
               <a:rPr lang="de-CH" smtClean="0"/>
-              <a:t>04.05.2015</a:t>
+              <a:t>05.05.2015</a:t>
             </a:fld>
             <a:endParaRPr lang="de-CH"/>
           </a:p>
@@ -1523,7 +1524,7 @@
           <a:p>
             <a:fld id="{8588FC70-2C7A-4951-B9AD-39FC0F67E4FE}" type="datetimeFigureOut">
               <a:rPr lang="de-CH" smtClean="0"/>
-              <a:t>04.05.2015</a:t>
+              <a:t>05.05.2015</a:t>
             </a:fld>
             <a:endParaRPr lang="de-CH"/>
           </a:p>
@@ -1932,7 +1933,7 @@
           <a:p>
             <a:fld id="{8588FC70-2C7A-4951-B9AD-39FC0F67E4FE}" type="datetimeFigureOut">
               <a:rPr lang="de-CH" smtClean="0"/>
-              <a:t>04.05.2015</a:t>
+              <a:t>05.05.2015</a:t>
             </a:fld>
             <a:endParaRPr lang="de-CH"/>
           </a:p>
@@ -2378,7 +2379,7 @@
           <a:p>
             <a:fld id="{8588FC70-2C7A-4951-B9AD-39FC0F67E4FE}" type="datetimeFigureOut">
               <a:rPr lang="de-CH" smtClean="0"/>
-              <a:t>04.05.2015</a:t>
+              <a:t>05.05.2015</a:t>
             </a:fld>
             <a:endParaRPr lang="de-CH"/>
           </a:p>
@@ -2479,7 +2480,7 @@
           <a:p>
             <a:fld id="{8588FC70-2C7A-4951-B9AD-39FC0F67E4FE}" type="datetimeFigureOut">
               <a:rPr lang="de-CH" smtClean="0"/>
-              <a:t>04.05.2015</a:t>
+              <a:t>05.05.2015</a:t>
             </a:fld>
             <a:endParaRPr lang="de-CH"/>
           </a:p>
@@ -2600,7 +2601,7 @@
           <a:p>
             <a:fld id="{8588FC70-2C7A-4951-B9AD-39FC0F67E4FE}" type="datetimeFigureOut">
               <a:rPr lang="de-CH" smtClean="0"/>
-              <a:t>04.05.2015</a:t>
+              <a:t>05.05.2015</a:t>
             </a:fld>
             <a:endParaRPr lang="de-CH"/>
           </a:p>
@@ -2874,7 +2875,7 @@
           <a:p>
             <a:fld id="{8588FC70-2C7A-4951-B9AD-39FC0F67E4FE}" type="datetimeFigureOut">
               <a:rPr lang="de-CH" smtClean="0"/>
-              <a:t>04.05.2015</a:t>
+              <a:t>05.05.2015</a:t>
             </a:fld>
             <a:endParaRPr lang="de-CH"/>
           </a:p>
@@ -3079,7 +3080,7 @@
           <a:p>
             <a:fld id="{8588FC70-2C7A-4951-B9AD-39FC0F67E4FE}" type="datetimeFigureOut">
               <a:rPr lang="de-CH" smtClean="0"/>
-              <a:t>04.05.2015</a:t>
+              <a:t>05.05.2015</a:t>
             </a:fld>
             <a:endParaRPr lang="de-CH"/>
           </a:p>
@@ -4188,7 +4189,7 @@
           <a:p>
             <a:fld id="{8588FC70-2C7A-4951-B9AD-39FC0F67E4FE}" type="datetimeFigureOut">
               <a:rPr lang="de-CH" smtClean="0"/>
-              <a:t>04.05.2015</a:t>
+              <a:t>05.05.2015</a:t>
             </a:fld>
             <a:endParaRPr lang="de-CH"/>
           </a:p>
@@ -5291,7 +5292,6 @@
               <a:rPr lang="de-CH" dirty="0" smtClean="0"/>
               <a:t>INTRO – Modulbesucher (Informatik, Elektrotechnik)</a:t>
             </a:r>
-            <a:endParaRPr lang="de-CH" dirty="0" smtClean="0"/>
           </a:p>
           <a:p>
             <a:r>
@@ -5312,7 +5312,6 @@
               <a:rPr lang="de-CH" dirty="0" smtClean="0"/>
               <a:t>-Entwickler</a:t>
             </a:r>
-            <a:endParaRPr lang="de-CH" dirty="0" smtClean="0"/>
           </a:p>
           <a:p>
             <a:endParaRPr lang="de-CH" dirty="0"/>
@@ -5389,6 +5388,179 @@
           <a:p>
             <a:r>
               <a:rPr lang="de-CH" dirty="0" smtClean="0"/>
+              <a:t>Nice </a:t>
+            </a:r>
+            <a:r>
+              <a:rPr lang="de-CH" dirty="0" err="1" smtClean="0"/>
+              <a:t>to</a:t>
+            </a:r>
+            <a:r>
+              <a:rPr lang="de-CH" dirty="0" smtClean="0"/>
+              <a:t> </a:t>
+            </a:r>
+            <a:r>
+              <a:rPr lang="de-CH" dirty="0" err="1" smtClean="0"/>
+              <a:t>know</a:t>
+            </a:r>
+            <a:endParaRPr lang="de-CH" dirty="0"/>
+          </a:p>
+        </p:txBody>
+      </p:sp>
+      <p:pic>
+        <p:nvPicPr>
+          <p:cNvPr id="1026" name="Picture 2"/>
+          <p:cNvPicPr>
+            <a:picLocks noChangeAspect="1" noChangeArrowheads="1"/>
+          </p:cNvPicPr>
+          <p:nvPr/>
+        </p:nvPicPr>
+        <p:blipFill>
+          <a:blip r:embed="rId2">
+            <a:extLst>
+              <a:ext uri="{28A0092B-C50C-407E-A947-70E740481C1C}">
+                <a14:useLocalDpi xmlns:a14="http://schemas.microsoft.com/office/drawing/2010/main" val="0"/>
+              </a:ext>
+            </a:extLst>
+          </a:blip>
+          <a:srcRect/>
+          <a:stretch>
+            <a:fillRect/>
+          </a:stretch>
+        </p:blipFill>
+        <p:spPr bwMode="auto">
+          <a:xfrm>
+            <a:off x="683568" y="1844824"/>
+            <a:ext cx="4152900" cy="647700"/>
+          </a:xfrm>
+          <a:prstGeom prst="rect">
+            <a:avLst/>
+          </a:prstGeom>
+          <a:noFill/>
+          <a:ln>
+            <a:noFill/>
+          </a:ln>
+          <a:extLst>
+            <a:ext uri="{909E8E84-426E-40DD-AFC4-6F175D3DCCD1}">
+              <a14:hiddenFill xmlns:a14="http://schemas.microsoft.com/office/drawing/2010/main">
+                <a:solidFill>
+                  <a:schemeClr val="accent1"/>
+                </a:solidFill>
+              </a14:hiddenFill>
+            </a:ext>
+            <a:ext uri="{91240B29-F687-4F45-9708-019B960494DF}">
+              <a14:hiddenLine xmlns:a14="http://schemas.microsoft.com/office/drawing/2010/main" w="9525">
+                <a:solidFill>
+                  <a:schemeClr val="tx1"/>
+                </a:solidFill>
+                <a:miter lim="800000"/>
+                <a:headEnd/>
+                <a:tailEnd/>
+              </a14:hiddenLine>
+            </a:ext>
+          </a:extLst>
+        </p:spPr>
+      </p:pic>
+      <p:pic>
+        <p:nvPicPr>
+          <p:cNvPr id="4" name="Picture 2"/>
+          <p:cNvPicPr>
+            <a:picLocks noChangeAspect="1" noChangeArrowheads="1"/>
+          </p:cNvPicPr>
+          <p:nvPr/>
+        </p:nvPicPr>
+        <p:blipFill>
+          <a:blip r:embed="rId3">
+            <a:extLst>
+              <a:ext uri="{28A0092B-C50C-407E-A947-70E740481C1C}">
+                <a14:useLocalDpi xmlns:a14="http://schemas.microsoft.com/office/drawing/2010/main" val="0"/>
+              </a:ext>
+            </a:extLst>
+          </a:blip>
+          <a:srcRect/>
+          <a:stretch>
+            <a:fillRect/>
+          </a:stretch>
+        </p:blipFill>
+        <p:spPr bwMode="auto">
+          <a:xfrm>
+            <a:off x="650244" y="2643188"/>
+            <a:ext cx="5133975" cy="523875"/>
+          </a:xfrm>
+          <a:prstGeom prst="rect">
+            <a:avLst/>
+          </a:prstGeom>
+          <a:noFill/>
+          <a:ln>
+            <a:noFill/>
+          </a:ln>
+          <a:extLst>
+            <a:ext uri="{909E8E84-426E-40DD-AFC4-6F175D3DCCD1}">
+              <a14:hiddenFill xmlns:a14="http://schemas.microsoft.com/office/drawing/2010/main">
+                <a:solidFill>
+                  <a:schemeClr val="accent1"/>
+                </a:solidFill>
+              </a14:hiddenFill>
+            </a:ext>
+            <a:ext uri="{91240B29-F687-4F45-9708-019B960494DF}">
+              <a14:hiddenLine xmlns:a14="http://schemas.microsoft.com/office/drawing/2010/main" w="9525">
+                <a:solidFill>
+                  <a:schemeClr val="tx1"/>
+                </a:solidFill>
+                <a:miter lim="800000"/>
+                <a:headEnd/>
+                <a:tailEnd/>
+              </a14:hiddenLine>
+            </a:ext>
+          </a:extLst>
+        </p:spPr>
+      </p:pic>
+    </p:spTree>
+    <p:extLst>
+      <p:ext uri="{BB962C8B-B14F-4D97-AF65-F5344CB8AC3E}">
+        <p14:creationId xmlns:p14="http://schemas.microsoft.com/office/powerpoint/2010/main" val="1945745746"/>
+      </p:ext>
+    </p:extLst>
+  </p:cSld>
+  <p:clrMapOvr>
+    <a:masterClrMapping/>
+  </p:clrMapOvr>
+</p:sld>
+</file>
+
+<file path=ppt/slides/slide6.xml><?xml version="1.0" encoding="utf-8"?>
+<p:sld xmlns:a="http://schemas.openxmlformats.org/drawingml/2006/main" xmlns:r="http://schemas.openxmlformats.org/officeDocument/2006/relationships" xmlns:p="http://schemas.openxmlformats.org/presentationml/2006/main">
+  <p:cSld>
+    <p:spTree>
+      <p:nvGrpSpPr>
+        <p:cNvPr id="1" name=""/>
+        <p:cNvGrpSpPr/>
+        <p:nvPr/>
+      </p:nvGrpSpPr>
+      <p:grpSpPr>
+        <a:xfrm>
+          <a:off x="0" y="0"/>
+          <a:ext cx="0" cy="0"/>
+          <a:chOff x="0" y="0"/>
+          <a:chExt cx="0" cy="0"/>
+        </a:xfrm>
+      </p:grpSpPr>
+      <p:sp>
+        <p:nvSpPr>
+          <p:cNvPr id="3" name="Titel 2"/>
+          <p:cNvSpPr>
+            <a:spLocks noGrp="1"/>
+          </p:cNvSpPr>
+          <p:nvPr>
+            <p:ph type="title"/>
+          </p:nvPr>
+        </p:nvSpPr>
+        <p:spPr/>
+        <p:txBody>
+          <a:bodyPr/>
+          <a:lstStyle/>
+          <a:p>
+            <a:r>
+              <a:rPr lang="de-CH" dirty="0" smtClean="0"/>
               <a:t>Demo</a:t>
             </a:r>
             <a:endParaRPr lang="de-CH" dirty="0"/>
@@ -5408,7 +5580,7 @@
 </p:sld>
 </file>
 
-<file path=ppt/slides/slide6.xml><?xml version="1.0" encoding="utf-8"?>
+<file path=ppt/slides/slide7.xml><?xml version="1.0" encoding="utf-8"?>
 <p:sld xmlns:a="http://schemas.openxmlformats.org/drawingml/2006/main" xmlns:r="http://schemas.openxmlformats.org/officeDocument/2006/relationships" xmlns:p="http://schemas.openxmlformats.org/presentationml/2006/main">
   <p:cSld>
     <p:spTree>

</xml_diff>